<commit_message>
Update Presentation for bank analysis and Adjust the energy consumption for different bank configuration
</commit_message>
<xml_diff>
--- a/DRAM_System_Analysis/WUPR_Architecture_Graph.pptx
+++ b/DRAM_System_Analysis/WUPR_Architecture_Graph.pptx
@@ -270,7 +270,7 @@
           <a:p>
             <a:fld id="{F15DAA47-81C0-42FD-A52E-49570AD7C90F}" type="datetimeFigureOut">
               <a:rPr lang="zh-TW" altLang="en-US" smtClean="0"/>
-              <a:t>2025/6/18</a:t>
+              <a:t>2025/6/24</a:t>
             </a:fld>
             <a:endParaRPr lang="zh-TW" altLang="en-US"/>
           </a:p>
@@ -468,7 +468,7 @@
           <a:p>
             <a:fld id="{F15DAA47-81C0-42FD-A52E-49570AD7C90F}" type="datetimeFigureOut">
               <a:rPr lang="zh-TW" altLang="en-US" smtClean="0"/>
-              <a:t>2025/6/18</a:t>
+              <a:t>2025/6/24</a:t>
             </a:fld>
             <a:endParaRPr lang="zh-TW" altLang="en-US"/>
           </a:p>
@@ -676,7 +676,7 @@
           <a:p>
             <a:fld id="{F15DAA47-81C0-42FD-A52E-49570AD7C90F}" type="datetimeFigureOut">
               <a:rPr lang="zh-TW" altLang="en-US" smtClean="0"/>
-              <a:t>2025/6/18</a:t>
+              <a:t>2025/6/24</a:t>
             </a:fld>
             <a:endParaRPr lang="zh-TW" altLang="en-US"/>
           </a:p>
@@ -874,7 +874,7 @@
           <a:p>
             <a:fld id="{F15DAA47-81C0-42FD-A52E-49570AD7C90F}" type="datetimeFigureOut">
               <a:rPr lang="zh-TW" altLang="en-US" smtClean="0"/>
-              <a:t>2025/6/18</a:t>
+              <a:t>2025/6/24</a:t>
             </a:fld>
             <a:endParaRPr lang="zh-TW" altLang="en-US"/>
           </a:p>
@@ -1149,7 +1149,7 @@
           <a:p>
             <a:fld id="{F15DAA47-81C0-42FD-A52E-49570AD7C90F}" type="datetimeFigureOut">
               <a:rPr lang="zh-TW" altLang="en-US" smtClean="0"/>
-              <a:t>2025/6/18</a:t>
+              <a:t>2025/6/24</a:t>
             </a:fld>
             <a:endParaRPr lang="zh-TW" altLang="en-US"/>
           </a:p>
@@ -1414,7 +1414,7 @@
           <a:p>
             <a:fld id="{F15DAA47-81C0-42FD-A52E-49570AD7C90F}" type="datetimeFigureOut">
               <a:rPr lang="zh-TW" altLang="en-US" smtClean="0"/>
-              <a:t>2025/6/18</a:t>
+              <a:t>2025/6/24</a:t>
             </a:fld>
             <a:endParaRPr lang="zh-TW" altLang="en-US"/>
           </a:p>
@@ -1826,7 +1826,7 @@
           <a:p>
             <a:fld id="{F15DAA47-81C0-42FD-A52E-49570AD7C90F}" type="datetimeFigureOut">
               <a:rPr lang="zh-TW" altLang="en-US" smtClean="0"/>
-              <a:t>2025/6/18</a:t>
+              <a:t>2025/6/24</a:t>
             </a:fld>
             <a:endParaRPr lang="zh-TW" altLang="en-US"/>
           </a:p>
@@ -1967,7 +1967,7 @@
           <a:p>
             <a:fld id="{F15DAA47-81C0-42FD-A52E-49570AD7C90F}" type="datetimeFigureOut">
               <a:rPr lang="zh-TW" altLang="en-US" smtClean="0"/>
-              <a:t>2025/6/18</a:t>
+              <a:t>2025/6/24</a:t>
             </a:fld>
             <a:endParaRPr lang="zh-TW" altLang="en-US"/>
           </a:p>
@@ -2080,7 +2080,7 @@
           <a:p>
             <a:fld id="{F15DAA47-81C0-42FD-A52E-49570AD7C90F}" type="datetimeFigureOut">
               <a:rPr lang="zh-TW" altLang="en-US" smtClean="0"/>
-              <a:t>2025/6/18</a:t>
+              <a:t>2025/6/24</a:t>
             </a:fld>
             <a:endParaRPr lang="zh-TW" altLang="en-US"/>
           </a:p>
@@ -2391,7 +2391,7 @@
           <a:p>
             <a:fld id="{F15DAA47-81C0-42FD-A52E-49570AD7C90F}" type="datetimeFigureOut">
               <a:rPr lang="zh-TW" altLang="en-US" smtClean="0"/>
-              <a:t>2025/6/18</a:t>
+              <a:t>2025/6/24</a:t>
             </a:fld>
             <a:endParaRPr lang="zh-TW" altLang="en-US"/>
           </a:p>
@@ -2679,7 +2679,7 @@
           <a:p>
             <a:fld id="{F15DAA47-81C0-42FD-A52E-49570AD7C90F}" type="datetimeFigureOut">
               <a:rPr lang="zh-TW" altLang="en-US" smtClean="0"/>
-              <a:t>2025/6/18</a:t>
+              <a:t>2025/6/24</a:t>
             </a:fld>
             <a:endParaRPr lang="zh-TW" altLang="en-US"/>
           </a:p>
@@ -2920,7 +2920,7 @@
           <a:p>
             <a:fld id="{F15DAA47-81C0-42FD-A52E-49570AD7C90F}" type="datetimeFigureOut">
               <a:rPr lang="zh-TW" altLang="en-US" smtClean="0"/>
-              <a:t>2025/6/18</a:t>
+              <a:t>2025/6/24</a:t>
             </a:fld>
             <a:endParaRPr lang="zh-TW" altLang="en-US"/>
           </a:p>
@@ -7474,12 +7474,12 @@
                     <a:p>
                       <a:pPr algn="l" fontAlgn="ctr"/>
                       <a:r>
-                        <a:rPr lang="en-US" sz="1200" u="none" strike="noStrike">
+                        <a:rPr lang="en-US" sz="1200" u="none" strike="noStrike" dirty="0">
                           <a:effectLst/>
                         </a:rPr>
                         <a:t>H</a:t>
                       </a:r>
-                      <a:endParaRPr lang="en-US" sz="1200" b="0" i="0" u="none" strike="noStrike">
+                      <a:endParaRPr lang="en-US" sz="1200" b="0" i="0" u="none" strike="noStrike" dirty="0">
                         <a:solidFill>
                           <a:srgbClr val="000000"/>
                         </a:solidFill>

</xml_diff>